<commit_message>
start writing new experiment
</commit_message>
<xml_diff>
--- a/publications/presentations/Quick Ed Awl presentation/slides.pptx
+++ b/publications/presentations/Quick Ed Awl presentation/slides.pptx
@@ -5,7 +5,7 @@
     <p:sldMasterId id="2147483660" r:id="rId1"/>
   </p:sldMasterIdLst>
   <p:notesMasterIdLst>
-    <p:notesMasterId r:id="rId28"/>
+    <p:notesMasterId r:id="rId27"/>
   </p:notesMasterIdLst>
   <p:sldIdLst>
     <p:sldId id="267" r:id="rId2"/>
@@ -22,18 +22,17 @@
     <p:sldId id="265" r:id="rId13"/>
     <p:sldId id="301" r:id="rId14"/>
     <p:sldId id="293" r:id="rId15"/>
-    <p:sldId id="294" r:id="rId16"/>
+    <p:sldId id="308" r:id="rId16"/>
     <p:sldId id="298" r:id="rId17"/>
     <p:sldId id="299" r:id="rId18"/>
-    <p:sldId id="300" r:id="rId19"/>
-    <p:sldId id="303" r:id="rId20"/>
-    <p:sldId id="302" r:id="rId21"/>
-    <p:sldId id="286" r:id="rId22"/>
-    <p:sldId id="261" r:id="rId23"/>
-    <p:sldId id="289" r:id="rId24"/>
-    <p:sldId id="304" r:id="rId25"/>
-    <p:sldId id="305" r:id="rId26"/>
-    <p:sldId id="306" r:id="rId27"/>
+    <p:sldId id="306" r:id="rId19"/>
+    <p:sldId id="300" r:id="rId20"/>
+    <p:sldId id="303" r:id="rId21"/>
+    <p:sldId id="302" r:id="rId22"/>
+    <p:sldId id="307" r:id="rId23"/>
+    <p:sldId id="286" r:id="rId24"/>
+    <p:sldId id="261" r:id="rId25"/>
+    <p:sldId id="289" r:id="rId26"/>
   </p:sldIdLst>
   <p:sldSz cx="9144000" cy="6858000" type="screen4x3"/>
   <p:notesSz cx="6858000" cy="9144000"/>
@@ -233,7 +232,7 @@
           <a:p>
             <a:fld id="{40D222CE-D4EE-48A4-9BA7-7AE7FBE795BF}" type="datetimeFigureOut">
               <a:rPr lang="de-CH" smtClean="0"/>
-              <a:t>04.12.2017</a:t>
+              <a:t>05.12.2017</a:t>
             </a:fld>
             <a:endParaRPr lang="de-CH"/>
           </a:p>
@@ -704,7 +703,7 @@
           <a:p>
             <a:fld id="{990EBBCE-5C80-44EE-88C5-9061D1436CD3}" type="datetimeFigureOut">
               <a:rPr lang="de-CH" smtClean="0"/>
-              <a:t>04.12.2017</a:t>
+              <a:t>05.12.2017</a:t>
             </a:fld>
             <a:endParaRPr lang="de-CH"/>
           </a:p>
@@ -1106,7 +1105,7 @@
           <a:p>
             <a:fld id="{990EBBCE-5C80-44EE-88C5-9061D1436CD3}" type="datetimeFigureOut">
               <a:rPr lang="de-CH" smtClean="0"/>
-              <a:t>04.12.2017</a:t>
+              <a:t>05.12.2017</a:t>
             </a:fld>
             <a:endParaRPr lang="de-CH"/>
           </a:p>
@@ -1288,7 +1287,7 @@
           <a:p>
             <a:fld id="{990EBBCE-5C80-44EE-88C5-9061D1436CD3}" type="datetimeFigureOut">
               <a:rPr lang="de-CH" smtClean="0"/>
-              <a:t>04.12.2017</a:t>
+              <a:t>05.12.2017</a:t>
             </a:fld>
             <a:endParaRPr lang="de-CH"/>
           </a:p>
@@ -1527,7 +1526,7 @@
           <a:p>
             <a:fld id="{990EBBCE-5C80-44EE-88C5-9061D1436CD3}" type="datetimeFigureOut">
               <a:rPr lang="de-CH" smtClean="0"/>
-              <a:t>04.12.2017</a:t>
+              <a:t>05.12.2017</a:t>
             </a:fld>
             <a:endParaRPr lang="de-CH"/>
           </a:p>
@@ -1737,7 +1736,7 @@
           <a:p>
             <a:fld id="{990EBBCE-5C80-44EE-88C5-9061D1436CD3}" type="datetimeFigureOut">
               <a:rPr lang="de-CH" smtClean="0"/>
-              <a:t>04.12.2017</a:t>
+              <a:t>05.12.2017</a:t>
             </a:fld>
             <a:endParaRPr lang="de-CH"/>
           </a:p>
@@ -2190,7 +2189,7 @@
           <a:p>
             <a:fld id="{990EBBCE-5C80-44EE-88C5-9061D1436CD3}" type="datetimeFigureOut">
               <a:rPr lang="de-CH" smtClean="0"/>
-              <a:t>04.12.2017</a:t>
+              <a:t>05.12.2017</a:t>
             </a:fld>
             <a:endParaRPr lang="de-CH"/>
           </a:p>
@@ -2431,7 +2430,7 @@
           <a:p>
             <a:fld id="{990EBBCE-5C80-44EE-88C5-9061D1436CD3}" type="datetimeFigureOut">
               <a:rPr lang="de-CH" smtClean="0"/>
-              <a:t>04.12.2017</a:t>
+              <a:t>05.12.2017</a:t>
             </a:fld>
             <a:endParaRPr lang="de-CH"/>
           </a:p>
@@ -3219,11 +3218,7 @@
             </a:pPr>
             <a:r>
               <a:rPr lang="en-US" dirty="0" smtClean="0"/>
-              <a:t>Re-categorized </a:t>
-            </a:r>
-            <a:r>
-              <a:rPr lang="en-US" dirty="0" smtClean="0"/>
-              <a:t>the probes:</a:t>
+              <a:t>Re-categorized the probes:</a:t>
             </a:r>
             <a:endParaRPr lang="de-CH" dirty="0"/>
           </a:p>
@@ -4835,7 +4830,7 @@
       </p:grpSpPr>
       <p:sp>
         <p:nvSpPr>
-          <p:cNvPr id="2" name="Title 1"/>
+          <p:cNvPr id="3" name="Title 2"/>
           <p:cNvSpPr>
             <a:spLocks noGrp="1"/>
           </p:cNvSpPr>
@@ -4848,145 +4843,66 @@
           <a:bodyPr/>
           <a:lstStyle/>
           <a:p>
-            <a:r>
-              <a:rPr lang="en-US" dirty="0" smtClean="0"/>
-              <a:t>Variable Precision</a:t>
-            </a:r>
-            <a:endParaRPr lang="de-CH" dirty="0"/>
+            <a:endParaRPr lang="de-CH"/>
           </a:p>
         </p:txBody>
       </p:sp>
       <p:sp>
         <p:nvSpPr>
-          <p:cNvPr id="3" name="Text Placeholder 2"/>
+          <p:cNvPr id="4" name="Content Placeholder 3"/>
           <p:cNvSpPr>
             <a:spLocks noGrp="1"/>
           </p:cNvSpPr>
           <p:nvPr>
-            <p:ph type="body" idx="1"/>
-          </p:nvPr>
-        </p:nvSpPr>
-        <p:spPr>
-          <a:xfrm>
-            <a:off x="457200" y="1853134"/>
-            <a:ext cx="4040188" cy="639762"/>
-          </a:xfrm>
-        </p:spPr>
+            <p:ph idx="1"/>
+          </p:nvPr>
+        </p:nvSpPr>
+        <p:spPr/>
         <p:txBody>
           <a:bodyPr/>
           <a:lstStyle/>
           <a:p>
             <a:r>
-              <a:rPr lang="en-US" dirty="0" smtClean="0"/>
-              <a:t>Probe Type</a:t>
-            </a:r>
+              <a:rPr lang="de-CH" dirty="0"/>
+              <a:t>Model Name: Interference Model, AIC: 39374.48509416144</a:t>
+            </a:r>
+          </a:p>
+          <a:p>
+            <a:r>
+              <a:rPr lang="de-CH" dirty="0"/>
+              <a:t>Parameters: ['b', 'a', 's', 'kappa', 'kappa_f', r']</a:t>
+            </a:r>
+          </a:p>
+          <a:p>
+            <a:r>
+              <a:rPr lang="de-CH" dirty="0"/>
+              <a:t>Parameters median:  [  0.0138   0.139   2.79   17.48  43.39   0.0705]</a:t>
+            </a:r>
+          </a:p>
+          <a:p>
+            <a:r>
+              <a:rPr lang="de-CH" dirty="0"/>
+              <a:t>Parameters mean:  [  0.0330   0.207   5.37   20.07   48.47   0.0706]</a:t>
+            </a:r>
+          </a:p>
+          <a:p>
             <a:endParaRPr lang="de-CH" dirty="0"/>
           </a:p>
+          <a:p>
+            <a:endParaRPr lang="de-CH" dirty="0"/>
+          </a:p>
         </p:txBody>
       </p:sp>
-      <p:pic>
-        <p:nvPicPr>
-          <p:cNvPr id="7" name="Content Placeholder 6"/>
-          <p:cNvPicPr>
-            <a:picLocks noGrp="1" noChangeAspect="1"/>
-          </p:cNvPicPr>
-          <p:nvPr>
-            <p:ph sz="half" idx="2"/>
-          </p:nvPr>
-        </p:nvPicPr>
-        <p:blipFill>
-          <a:blip r:embed="rId2">
-            <a:extLst>
-              <a:ext uri="{28A0092B-C50C-407E-A947-70E740481C1C}">
-                <a14:useLocalDpi xmlns:a14="http://schemas.microsoft.com/office/drawing/2010/main" val="0"/>
-              </a:ext>
-            </a:extLst>
-          </a:blip>
-          <a:stretch>
-            <a:fillRect/>
-          </a:stretch>
-        </p:blipFill>
-        <p:spPr>
-          <a:xfrm>
-            <a:off x="457201" y="2635449"/>
-            <a:ext cx="4040186" cy="3030139"/>
-          </a:xfrm>
-        </p:spPr>
-      </p:pic>
-      <p:sp>
-        <p:nvSpPr>
-          <p:cNvPr id="5" name="Text Placeholder 4"/>
-          <p:cNvSpPr>
-            <a:spLocks noGrp="1"/>
-          </p:cNvSpPr>
-          <p:nvPr>
-            <p:ph type="body" sz="quarter" idx="3"/>
-          </p:nvPr>
-        </p:nvSpPr>
-        <p:spPr>
-          <a:xfrm>
-            <a:off x="4645025" y="1853134"/>
-            <a:ext cx="4041775" cy="639762"/>
-          </a:xfrm>
-        </p:spPr>
-        <p:txBody>
-          <a:bodyPr/>
-          <a:lstStyle/>
-          <a:p>
-            <a:r>
-              <a:rPr lang="en-US" dirty="0" smtClean="0"/>
-              <a:t>Response Distribution</a:t>
-            </a:r>
-            <a:endParaRPr lang="de-CH" dirty="0"/>
-          </a:p>
-        </p:txBody>
-      </p:sp>
-      <p:pic>
-        <p:nvPicPr>
-          <p:cNvPr id="8" name="Content Placeholder 7"/>
-          <p:cNvPicPr>
-            <a:picLocks noGrp="1" noChangeAspect="1"/>
-          </p:cNvPicPr>
-          <p:nvPr>
-            <p:ph sz="quarter" idx="4"/>
-          </p:nvPr>
-        </p:nvPicPr>
-        <p:blipFill>
-          <a:blip r:embed="rId3">
-            <a:extLst>
-              <a:ext uri="{28A0092B-C50C-407E-A947-70E740481C1C}">
-                <a14:useLocalDpi xmlns:a14="http://schemas.microsoft.com/office/drawing/2010/main" val="0"/>
-              </a:ext>
-            </a:extLst>
-          </a:blip>
-          <a:stretch>
-            <a:fillRect/>
-          </a:stretch>
-        </p:blipFill>
-        <p:spPr>
-          <a:xfrm>
-            <a:off x="4645025" y="2634853"/>
-            <a:ext cx="4041773" cy="3031329"/>
-          </a:xfrm>
-        </p:spPr>
-      </p:pic>
     </p:spTree>
     <p:extLst>
       <p:ext uri="{BB962C8B-B14F-4D97-AF65-F5344CB8AC3E}">
-        <p14:creationId xmlns:p14="http://schemas.microsoft.com/office/powerpoint/2010/main" val="2450331596"/>
+        <p14:creationId xmlns:p14="http://schemas.microsoft.com/office/powerpoint/2010/main" val="3803352362"/>
       </p:ext>
     </p:extLst>
   </p:cSld>
   <p:clrMapOvr>
     <a:masterClrMapping/>
   </p:clrMapOvr>
-  <p:timing>
-    <p:tnLst>
-      <p:par>
-        <p:cTn id="1" dur="indefinite" restart="never" nodeType="tmRoot"/>
-      </p:par>
-    </p:tnLst>
-  </p:timing>
 </p:sld>
 </file>
 
@@ -5257,7 +5173,7 @@
         <p:spPr>
           <a:xfrm>
             <a:off x="457201" y="2635449"/>
-            <a:ext cx="4040185" cy="3030139"/>
+            <a:ext cx="4040185" cy="3030138"/>
           </a:xfrm>
         </p:spPr>
       </p:pic>
@@ -5370,6 +5286,131 @@
           <a:bodyPr/>
           <a:lstStyle/>
           <a:p>
+            <a:endParaRPr lang="de-CH"/>
+          </a:p>
+        </p:txBody>
+      </p:sp>
+      <p:sp>
+        <p:nvSpPr>
+          <p:cNvPr id="3" name="Content Placeholder 2"/>
+          <p:cNvSpPr>
+            <a:spLocks noGrp="1"/>
+          </p:cNvSpPr>
+          <p:nvPr>
+            <p:ph idx="1"/>
+          </p:nvPr>
+        </p:nvSpPr>
+        <p:spPr/>
+        <p:txBody>
+          <a:bodyPr/>
+          <a:lstStyle/>
+          <a:p>
+            <a:r>
+              <a:rPr lang="de-CH" dirty="0"/>
+              <a:t>Model Name: Variable Precision Model, AIC: 40964.289815251075</a:t>
+            </a:r>
+          </a:p>
+          <a:p>
+            <a:r>
+              <a:rPr lang="de-CH" dirty="0"/>
+              <a:t>Parameters: ['J1', 'tau', 'aplha']</a:t>
+            </a:r>
+          </a:p>
+          <a:p>
+            <a:r>
+              <a:rPr lang="de-CH" dirty="0"/>
+              <a:t>Parameters median:  [ 86.53  84.16   0.967]</a:t>
+            </a:r>
+          </a:p>
+          <a:p>
+            <a:r>
+              <a:rPr lang="de-CH" dirty="0"/>
+              <a:t>Parameters mean:  [ 76.66  71.75   0.942]</a:t>
+            </a:r>
+          </a:p>
+          <a:p>
+            <a:endParaRPr lang="de-CH" dirty="0"/>
+          </a:p>
+          <a:p>
+            <a:r>
+              <a:rPr lang="de-CH" dirty="0"/>
+              <a:t>Model Name: Variable Precision Model with Binding, AIC: 39958.2773497592</a:t>
+            </a:r>
+          </a:p>
+          <a:p>
+            <a:r>
+              <a:rPr lang="de-CH" dirty="0"/>
+              <a:t>Parameters: ['J1', 'tau', 'aplha', </a:t>
+            </a:r>
+            <a:r>
+              <a:rPr lang="de-CH"/>
+              <a:t>'s</a:t>
+            </a:r>
+            <a:r>
+              <a:rPr lang="de-CH" smtClean="0"/>
+              <a:t>']</a:t>
+            </a:r>
+            <a:endParaRPr lang="de-CH" dirty="0"/>
+          </a:p>
+          <a:p>
+            <a:r>
+              <a:rPr lang="de-CH" dirty="0"/>
+              <a:t>Parameters median:  [ 78.02  47.13  0.627  0.0868]</a:t>
+            </a:r>
+          </a:p>
+          <a:p>
+            <a:r>
+              <a:rPr lang="de-CH" dirty="0"/>
+              <a:t>Parameters mean:  [ 71.73  54.35  0.585  0.0907]</a:t>
+            </a:r>
+          </a:p>
+        </p:txBody>
+      </p:sp>
+    </p:spTree>
+    <p:extLst>
+      <p:ext uri="{BB962C8B-B14F-4D97-AF65-F5344CB8AC3E}">
+        <p14:creationId xmlns:p14="http://schemas.microsoft.com/office/powerpoint/2010/main" val="85161626"/>
+      </p:ext>
+    </p:extLst>
+  </p:cSld>
+  <p:clrMapOvr>
+    <a:masterClrMapping/>
+  </p:clrMapOvr>
+</p:sld>
+</file>
+
+<file path=ppt/slides/slide19.xml><?xml version="1.0" encoding="utf-8"?>
+<p:sld xmlns:a="http://schemas.openxmlformats.org/drawingml/2006/main" xmlns:r="http://schemas.openxmlformats.org/officeDocument/2006/relationships" xmlns:p="http://schemas.openxmlformats.org/presentationml/2006/main">
+  <p:cSld>
+    <p:spTree>
+      <p:nvGrpSpPr>
+        <p:cNvPr id="1" name=""/>
+        <p:cNvGrpSpPr/>
+        <p:nvPr/>
+      </p:nvGrpSpPr>
+      <p:grpSpPr>
+        <a:xfrm>
+          <a:off x="0" y="0"/>
+          <a:ext cx="0" cy="0"/>
+          <a:chOff x="0" y="0"/>
+          <a:chExt cx="0" cy="0"/>
+        </a:xfrm>
+      </p:grpSpPr>
+      <p:sp>
+        <p:nvSpPr>
+          <p:cNvPr id="2" name="Title 1"/>
+          <p:cNvSpPr>
+            <a:spLocks noGrp="1"/>
+          </p:cNvSpPr>
+          <p:nvPr>
+            <p:ph type="title"/>
+          </p:nvPr>
+        </p:nvSpPr>
+        <p:spPr/>
+        <p:txBody>
+          <a:bodyPr/>
+          <a:lstStyle/>
+          <a:p>
             <a:r>
               <a:rPr lang="en-US" dirty="0" smtClean="0"/>
               <a:t>Slot-averaging model (no PM in inference)</a:t>
@@ -5507,180 +5548,6 @@
     <p:extLst>
       <p:ext uri="{BB962C8B-B14F-4D97-AF65-F5344CB8AC3E}">
         <p14:creationId xmlns:p14="http://schemas.microsoft.com/office/powerpoint/2010/main" val="342210789"/>
-      </p:ext>
-    </p:extLst>
-  </p:cSld>
-  <p:clrMapOvr>
-    <a:masterClrMapping/>
-  </p:clrMapOvr>
-  <p:timing>
-    <p:tnLst>
-      <p:par>
-        <p:cTn id="1" dur="indefinite" restart="never" nodeType="tmRoot"/>
-      </p:par>
-    </p:tnLst>
-  </p:timing>
-</p:sld>
-</file>
-
-<file path=ppt/slides/slide19.xml><?xml version="1.0" encoding="utf-8"?>
-<p:sld xmlns:a="http://schemas.openxmlformats.org/drawingml/2006/main" xmlns:r="http://schemas.openxmlformats.org/officeDocument/2006/relationships" xmlns:p="http://schemas.openxmlformats.org/presentationml/2006/main">
-  <p:cSld>
-    <p:spTree>
-      <p:nvGrpSpPr>
-        <p:cNvPr id="1" name=""/>
-        <p:cNvGrpSpPr/>
-        <p:nvPr/>
-      </p:nvGrpSpPr>
-      <p:grpSpPr>
-        <a:xfrm>
-          <a:off x="0" y="0"/>
-          <a:ext cx="0" cy="0"/>
-          <a:chOff x="0" y="0"/>
-          <a:chExt cx="0" cy="0"/>
-        </a:xfrm>
-      </p:grpSpPr>
-      <p:sp>
-        <p:nvSpPr>
-          <p:cNvPr id="2" name="Title 1"/>
-          <p:cNvSpPr>
-            <a:spLocks noGrp="1"/>
-          </p:cNvSpPr>
-          <p:nvPr>
-            <p:ph type="title"/>
-          </p:nvPr>
-        </p:nvSpPr>
-        <p:spPr/>
-        <p:txBody>
-          <a:bodyPr/>
-          <a:lstStyle/>
-          <a:p>
-            <a:r>
-              <a:rPr lang="en-US" dirty="0" smtClean="0"/>
-              <a:t>Slot-averaging model</a:t>
-            </a:r>
-            <a:endParaRPr lang="de-CH" dirty="0"/>
-          </a:p>
-        </p:txBody>
-      </p:sp>
-      <p:sp>
-        <p:nvSpPr>
-          <p:cNvPr id="3" name="Text Placeholder 2"/>
-          <p:cNvSpPr>
-            <a:spLocks noGrp="1"/>
-          </p:cNvSpPr>
-          <p:nvPr>
-            <p:ph type="body" idx="1"/>
-          </p:nvPr>
-        </p:nvSpPr>
-        <p:spPr>
-          <a:xfrm>
-            <a:off x="457200" y="1853134"/>
-            <a:ext cx="4040188" cy="639762"/>
-          </a:xfrm>
-        </p:spPr>
-        <p:txBody>
-          <a:bodyPr/>
-          <a:lstStyle/>
-          <a:p>
-            <a:r>
-              <a:rPr lang="en-US" dirty="0" smtClean="0"/>
-              <a:t>Probe Type</a:t>
-            </a:r>
-            <a:endParaRPr lang="de-CH" dirty="0"/>
-          </a:p>
-        </p:txBody>
-      </p:sp>
-      <p:pic>
-        <p:nvPicPr>
-          <p:cNvPr id="7" name="Content Placeholder 6"/>
-          <p:cNvPicPr>
-            <a:picLocks noGrp="1" noChangeAspect="1"/>
-          </p:cNvPicPr>
-          <p:nvPr>
-            <p:ph sz="half" idx="2"/>
-          </p:nvPr>
-        </p:nvPicPr>
-        <p:blipFill>
-          <a:blip r:embed="rId2">
-            <a:extLst>
-              <a:ext uri="{28A0092B-C50C-407E-A947-70E740481C1C}">
-                <a14:useLocalDpi xmlns:a14="http://schemas.microsoft.com/office/drawing/2010/main" val="0"/>
-              </a:ext>
-            </a:extLst>
-          </a:blip>
-          <a:stretch>
-            <a:fillRect/>
-          </a:stretch>
-        </p:blipFill>
-        <p:spPr>
-          <a:xfrm>
-            <a:off x="457201" y="2635449"/>
-            <a:ext cx="4040185" cy="3030139"/>
-          </a:xfrm>
-        </p:spPr>
-      </p:pic>
-      <p:sp>
-        <p:nvSpPr>
-          <p:cNvPr id="5" name="Text Placeholder 4"/>
-          <p:cNvSpPr>
-            <a:spLocks noGrp="1"/>
-          </p:cNvSpPr>
-          <p:nvPr>
-            <p:ph type="body" sz="quarter" idx="3"/>
-          </p:nvPr>
-        </p:nvSpPr>
-        <p:spPr>
-          <a:xfrm>
-            <a:off x="4645025" y="1853134"/>
-            <a:ext cx="4041775" cy="639762"/>
-          </a:xfrm>
-        </p:spPr>
-        <p:txBody>
-          <a:bodyPr/>
-          <a:lstStyle/>
-          <a:p>
-            <a:r>
-              <a:rPr lang="en-US" dirty="0" smtClean="0"/>
-              <a:t>Response Distribution</a:t>
-            </a:r>
-            <a:endParaRPr lang="de-CH" dirty="0"/>
-          </a:p>
-        </p:txBody>
-      </p:sp>
-      <p:pic>
-        <p:nvPicPr>
-          <p:cNvPr id="8" name="Content Placeholder 7"/>
-          <p:cNvPicPr>
-            <a:picLocks noGrp="1" noChangeAspect="1"/>
-          </p:cNvPicPr>
-          <p:nvPr>
-            <p:ph sz="quarter" idx="4"/>
-          </p:nvPr>
-        </p:nvPicPr>
-        <p:blipFill>
-          <a:blip r:embed="rId3">
-            <a:extLst>
-              <a:ext uri="{28A0092B-C50C-407E-A947-70E740481C1C}">
-                <a14:useLocalDpi xmlns:a14="http://schemas.microsoft.com/office/drawing/2010/main" val="0"/>
-              </a:ext>
-            </a:extLst>
-          </a:blip>
-          <a:stretch>
-            <a:fillRect/>
-          </a:stretch>
-        </p:blipFill>
-        <p:spPr>
-          <a:xfrm>
-            <a:off x="4645025" y="2634853"/>
-            <a:ext cx="4041772" cy="3031329"/>
-          </a:xfrm>
-        </p:spPr>
-      </p:pic>
-    </p:spTree>
-    <p:extLst>
-      <p:ext uri="{BB962C8B-B14F-4D97-AF65-F5344CB8AC3E}">
-        <p14:creationId xmlns:p14="http://schemas.microsoft.com/office/powerpoint/2010/main" val="3221218817"/>
       </p:ext>
     </p:extLst>
   </p:cSld>
@@ -6086,7 +5953,7 @@
           <a:p>
             <a:r>
               <a:rPr lang="en-US" dirty="0" smtClean="0"/>
-              <a:t>Slot-averaging + Swap model</a:t>
+              <a:t>Slot-averaging model</a:t>
             </a:r>
             <a:endParaRPr lang="de-CH" dirty="0"/>
           </a:p>
@@ -6145,7 +6012,181 @@
         <p:spPr>
           <a:xfrm>
             <a:off x="457201" y="2635449"/>
-            <a:ext cx="4040185" cy="3030138"/>
+            <a:ext cx="4040185" cy="3030139"/>
+          </a:xfrm>
+        </p:spPr>
+      </p:pic>
+      <p:sp>
+        <p:nvSpPr>
+          <p:cNvPr id="5" name="Text Placeholder 4"/>
+          <p:cNvSpPr>
+            <a:spLocks noGrp="1"/>
+          </p:cNvSpPr>
+          <p:nvPr>
+            <p:ph type="body" sz="quarter" idx="3"/>
+          </p:nvPr>
+        </p:nvSpPr>
+        <p:spPr>
+          <a:xfrm>
+            <a:off x="4645025" y="1853134"/>
+            <a:ext cx="4041775" cy="639762"/>
+          </a:xfrm>
+        </p:spPr>
+        <p:txBody>
+          <a:bodyPr/>
+          <a:lstStyle/>
+          <a:p>
+            <a:r>
+              <a:rPr lang="en-US" dirty="0" smtClean="0"/>
+              <a:t>Response Distribution</a:t>
+            </a:r>
+            <a:endParaRPr lang="de-CH" dirty="0"/>
+          </a:p>
+        </p:txBody>
+      </p:sp>
+      <p:pic>
+        <p:nvPicPr>
+          <p:cNvPr id="8" name="Content Placeholder 7"/>
+          <p:cNvPicPr>
+            <a:picLocks noGrp="1" noChangeAspect="1"/>
+          </p:cNvPicPr>
+          <p:nvPr>
+            <p:ph sz="quarter" idx="4"/>
+          </p:nvPr>
+        </p:nvPicPr>
+        <p:blipFill>
+          <a:blip r:embed="rId3">
+            <a:extLst>
+              <a:ext uri="{28A0092B-C50C-407E-A947-70E740481C1C}">
+                <a14:useLocalDpi xmlns:a14="http://schemas.microsoft.com/office/drawing/2010/main" val="0"/>
+              </a:ext>
+            </a:extLst>
+          </a:blip>
+          <a:stretch>
+            <a:fillRect/>
+          </a:stretch>
+        </p:blipFill>
+        <p:spPr>
+          <a:xfrm>
+            <a:off x="4645025" y="2634853"/>
+            <a:ext cx="4041772" cy="3031329"/>
+          </a:xfrm>
+        </p:spPr>
+      </p:pic>
+    </p:spTree>
+    <p:extLst>
+      <p:ext uri="{BB962C8B-B14F-4D97-AF65-F5344CB8AC3E}">
+        <p14:creationId xmlns:p14="http://schemas.microsoft.com/office/powerpoint/2010/main" val="3221218817"/>
+      </p:ext>
+    </p:extLst>
+  </p:cSld>
+  <p:clrMapOvr>
+    <a:masterClrMapping/>
+  </p:clrMapOvr>
+  <p:timing>
+    <p:tnLst>
+      <p:par>
+        <p:cTn id="1" dur="indefinite" restart="never" nodeType="tmRoot"/>
+      </p:par>
+    </p:tnLst>
+  </p:timing>
+</p:sld>
+</file>
+
+<file path=ppt/slides/slide21.xml><?xml version="1.0" encoding="utf-8"?>
+<p:sld xmlns:a="http://schemas.openxmlformats.org/drawingml/2006/main" xmlns:r="http://schemas.openxmlformats.org/officeDocument/2006/relationships" xmlns:p="http://schemas.openxmlformats.org/presentationml/2006/main">
+  <p:cSld>
+    <p:spTree>
+      <p:nvGrpSpPr>
+        <p:cNvPr id="1" name=""/>
+        <p:cNvGrpSpPr/>
+        <p:nvPr/>
+      </p:nvGrpSpPr>
+      <p:grpSpPr>
+        <a:xfrm>
+          <a:off x="0" y="0"/>
+          <a:ext cx="0" cy="0"/>
+          <a:chOff x="0" y="0"/>
+          <a:chExt cx="0" cy="0"/>
+        </a:xfrm>
+      </p:grpSpPr>
+      <p:sp>
+        <p:nvSpPr>
+          <p:cNvPr id="2" name="Title 1"/>
+          <p:cNvSpPr>
+            <a:spLocks noGrp="1"/>
+          </p:cNvSpPr>
+          <p:nvPr>
+            <p:ph type="title"/>
+          </p:nvPr>
+        </p:nvSpPr>
+        <p:spPr/>
+        <p:txBody>
+          <a:bodyPr/>
+          <a:lstStyle/>
+          <a:p>
+            <a:r>
+              <a:rPr lang="en-US" dirty="0" smtClean="0"/>
+              <a:t>Slot-averaging + Swap model</a:t>
+            </a:r>
+            <a:endParaRPr lang="de-CH" dirty="0"/>
+          </a:p>
+        </p:txBody>
+      </p:sp>
+      <p:sp>
+        <p:nvSpPr>
+          <p:cNvPr id="3" name="Text Placeholder 2"/>
+          <p:cNvSpPr>
+            <a:spLocks noGrp="1"/>
+          </p:cNvSpPr>
+          <p:nvPr>
+            <p:ph type="body" idx="1"/>
+          </p:nvPr>
+        </p:nvSpPr>
+        <p:spPr>
+          <a:xfrm>
+            <a:off x="457200" y="1853134"/>
+            <a:ext cx="4040188" cy="639762"/>
+          </a:xfrm>
+        </p:spPr>
+        <p:txBody>
+          <a:bodyPr/>
+          <a:lstStyle/>
+          <a:p>
+            <a:r>
+              <a:rPr lang="en-US" dirty="0" smtClean="0"/>
+              <a:t>Probe Type</a:t>
+            </a:r>
+            <a:endParaRPr lang="de-CH" dirty="0"/>
+          </a:p>
+        </p:txBody>
+      </p:sp>
+      <p:pic>
+        <p:nvPicPr>
+          <p:cNvPr id="7" name="Content Placeholder 6"/>
+          <p:cNvPicPr>
+            <a:picLocks noGrp="1" noChangeAspect="1"/>
+          </p:cNvPicPr>
+          <p:nvPr>
+            <p:ph sz="half" idx="2"/>
+          </p:nvPr>
+        </p:nvPicPr>
+        <p:blipFill>
+          <a:blip r:embed="rId2">
+            <a:extLst>
+              <a:ext uri="{28A0092B-C50C-407E-A947-70E740481C1C}">
+                <a14:useLocalDpi xmlns:a14="http://schemas.microsoft.com/office/drawing/2010/main" val="0"/>
+              </a:ext>
+            </a:extLst>
+          </a:blip>
+          <a:stretch>
+            <a:fillRect/>
+          </a:stretch>
+        </p:blipFill>
+        <p:spPr>
+          <a:xfrm>
+            <a:off x="457201" y="2635449"/>
+            <a:ext cx="4040184" cy="3030138"/>
           </a:xfrm>
         </p:spPr>
       </p:pic>
@@ -6226,116 +6267,6 @@
 </p:sld>
 </file>
 
-<file path=ppt/slides/slide21.xml><?xml version="1.0" encoding="utf-8"?>
-<p:sld xmlns:a="http://schemas.openxmlformats.org/drawingml/2006/main" xmlns:r="http://schemas.openxmlformats.org/officeDocument/2006/relationships" xmlns:p="http://schemas.openxmlformats.org/presentationml/2006/main">
-  <p:cSld>
-    <p:spTree>
-      <p:nvGrpSpPr>
-        <p:cNvPr id="1" name=""/>
-        <p:cNvGrpSpPr/>
-        <p:nvPr/>
-      </p:nvGrpSpPr>
-      <p:grpSpPr>
-        <a:xfrm>
-          <a:off x="0" y="0"/>
-          <a:ext cx="0" cy="0"/>
-          <a:chOff x="0" y="0"/>
-          <a:chExt cx="0" cy="0"/>
-        </a:xfrm>
-      </p:grpSpPr>
-      <p:sp>
-        <p:nvSpPr>
-          <p:cNvPr id="7" name="Title 6"/>
-          <p:cNvSpPr>
-            <a:spLocks noGrp="1"/>
-          </p:cNvSpPr>
-          <p:nvPr>
-            <p:ph type="title"/>
-          </p:nvPr>
-        </p:nvSpPr>
-        <p:spPr/>
-        <p:txBody>
-          <a:bodyPr/>
-          <a:lstStyle/>
-          <a:p>
-            <a:r>
-              <a:rPr lang="en-US" dirty="0" smtClean="0"/>
-              <a:t>Conclusion</a:t>
-            </a:r>
-            <a:endParaRPr lang="de-CH" dirty="0"/>
-          </a:p>
-        </p:txBody>
-      </p:sp>
-      <p:sp>
-        <p:nvSpPr>
-          <p:cNvPr id="8" name="Content Placeholder 7"/>
-          <p:cNvSpPr>
-            <a:spLocks noGrp="1"/>
-          </p:cNvSpPr>
-          <p:nvPr>
-            <p:ph idx="1"/>
-          </p:nvPr>
-        </p:nvSpPr>
-        <p:spPr/>
-        <p:txBody>
-          <a:bodyPr/>
-          <a:lstStyle/>
-          <a:p>
-            <a:pPr marL="285750" indent="-285750">
-              <a:buFont typeface="Arial" panose="020B0604020202020204" pitchFamily="34" charset="0"/>
-              <a:buChar char="•"/>
-            </a:pPr>
-            <a:r>
-              <a:rPr lang="en-US" dirty="0" smtClean="0"/>
-              <a:t>Interference Model is the only model able to predict the intrusion cost without additional assumptions. </a:t>
-            </a:r>
-          </a:p>
-          <a:p>
-            <a:pPr marL="631825" lvl="1" indent="-285750">
-              <a:buFont typeface="Arial" panose="020B0604020202020204" pitchFamily="34" charset="0"/>
-              <a:buChar char="•"/>
-            </a:pPr>
-            <a:r>
-              <a:rPr lang="en-US" dirty="0" smtClean="0"/>
-              <a:t>Maybe we don’t need a hard limit to explain working memory capacity.</a:t>
-            </a:r>
-          </a:p>
-          <a:p>
-            <a:pPr marL="631825" lvl="1" indent="-285750">
-              <a:buFont typeface="Arial" panose="020B0604020202020204" pitchFamily="34" charset="0"/>
-              <a:buChar char="•"/>
-            </a:pPr>
-            <a:endParaRPr lang="en-US" dirty="0"/>
-          </a:p>
-          <a:p>
-            <a:pPr marL="285750" indent="-285750">
-              <a:buFont typeface="Arial" panose="020B0604020202020204" pitchFamily="34" charset="0"/>
-              <a:buChar char="•"/>
-            </a:pPr>
-            <a:endParaRPr lang="de-CH" dirty="0"/>
-          </a:p>
-        </p:txBody>
-      </p:sp>
-    </p:spTree>
-    <p:extLst>
-      <p:ext uri="{BB962C8B-B14F-4D97-AF65-F5344CB8AC3E}">
-        <p14:creationId xmlns:p14="http://schemas.microsoft.com/office/powerpoint/2010/main" val="76387203"/>
-      </p:ext>
-    </p:extLst>
-  </p:cSld>
-  <p:clrMapOvr>
-    <a:masterClrMapping/>
-  </p:clrMapOvr>
-  <p:timing>
-    <p:tnLst>
-      <p:par>
-        <p:cTn id="1" dur="indefinite" restart="never" nodeType="tmRoot"/>
-      </p:par>
-    </p:tnLst>
-  </p:timing>
-</p:sld>
-</file>
-
 <file path=ppt/slides/slide22.xml><?xml version="1.0" encoding="utf-8"?>
 <p:sld xmlns:a="http://schemas.openxmlformats.org/drawingml/2006/main" xmlns:r="http://schemas.openxmlformats.org/officeDocument/2006/relationships" xmlns:p="http://schemas.openxmlformats.org/presentationml/2006/main">
   <p:cSld>
@@ -6368,11 +6299,7 @@
           <a:bodyPr/>
           <a:lstStyle/>
           <a:p>
-            <a:r>
-              <a:rPr lang="en-US" dirty="0" smtClean="0"/>
-              <a:t>Caveat</a:t>
-            </a:r>
-            <a:endParaRPr lang="de-CH" dirty="0"/>
+            <a:endParaRPr lang="de-CH"/>
           </a:p>
         </p:txBody>
       </p:sp>
@@ -6391,65 +6318,94 @@
           <a:bodyPr/>
           <a:lstStyle/>
           <a:p>
-            <a:pPr marL="285750" indent="-285750">
-              <a:buFont typeface="Arial" panose="020B0604020202020204" pitchFamily="34" charset="0"/>
-              <a:buChar char="•"/>
-            </a:pPr>
-            <a:r>
-              <a:rPr lang="en-US" dirty="0" smtClean="0"/>
-              <a:t>The set-size effect of the intrusion cost</a:t>
-            </a:r>
-          </a:p>
-          <a:p>
-            <a:pPr marL="631825" lvl="1" indent="-285750">
-              <a:buFont typeface="Arial" panose="020B0604020202020204" pitchFamily="34" charset="0"/>
-              <a:buChar char="•"/>
-            </a:pPr>
-            <a:r>
-              <a:rPr lang="en-US" dirty="0" smtClean="0"/>
-              <a:t>IM can not predict any the effect of set size on intrusion cost</a:t>
-            </a:r>
-          </a:p>
-          <a:p>
-            <a:pPr marL="631825" lvl="1" indent="-285750">
-              <a:buFont typeface="Arial" panose="020B0604020202020204" pitchFamily="34" charset="0"/>
-              <a:buChar char="•"/>
-            </a:pPr>
-            <a:r>
-              <a:rPr lang="en-US" dirty="0" smtClean="0"/>
-              <a:t>However, there might be a set size effect.</a:t>
-            </a:r>
-          </a:p>
-          <a:p>
-            <a:pPr marL="631825" lvl="1" indent="-285750">
-              <a:buFont typeface="Arial" panose="020B0604020202020204" pitchFamily="34" charset="0"/>
-              <a:buChar char="•"/>
-            </a:pPr>
-            <a:r>
-              <a:rPr lang="en-US" dirty="0" smtClean="0"/>
-              <a:t>Bayes factor is 0.39 in favor of no set-size effect in the presented experiment.</a:t>
-            </a:r>
-            <a:endParaRPr lang="en-US" dirty="0"/>
+            <a:r>
+              <a:rPr lang="de-CH" dirty="0"/>
+              <a:t>Model Name: Slot Averaging Model, AIC: 44974.97870198049</a:t>
+            </a:r>
+          </a:p>
+          <a:p>
+            <a:r>
+              <a:rPr lang="de-CH" dirty="0"/>
+              <a:t>Parameters: ['k', 'kappa']</a:t>
+            </a:r>
+          </a:p>
+          <a:p>
+            <a:r>
+              <a:rPr lang="de-CH" dirty="0"/>
+              <a:t>Parameters median:  [  1.79  30.34]</a:t>
+            </a:r>
+          </a:p>
+          <a:p>
+            <a:r>
+              <a:rPr lang="de-CH" dirty="0"/>
+              <a:t>Parameters mean:  [  1.88  32.40]</a:t>
+            </a:r>
+          </a:p>
+          <a:p>
+            <a:endParaRPr lang="de-CH" dirty="0"/>
+          </a:p>
+          <a:p>
+            <a:r>
+              <a:rPr lang="de-CH" dirty="0"/>
+              <a:t>Model Name: Slot Averaging Model with Binding (growing), AIC: </a:t>
+            </a:r>
+            <a:r>
+              <a:rPr lang="de-CH" dirty="0" smtClean="0"/>
+              <a:t>40763.879413394054</a:t>
+            </a:r>
+          </a:p>
+          <a:p>
+            <a:r>
+              <a:rPr lang="de-CH" dirty="0" smtClean="0"/>
+              <a:t>Parameters</a:t>
+            </a:r>
+            <a:r>
+              <a:rPr lang="de-CH" dirty="0"/>
+              <a:t>: ['k', 'kappa', 's'] </a:t>
+            </a:r>
+            <a:endParaRPr lang="de-CH" dirty="0" smtClean="0"/>
+          </a:p>
+          <a:p>
+            <a:r>
+              <a:rPr lang="de-CH" dirty="0" smtClean="0"/>
+              <a:t>Parameters </a:t>
+            </a:r>
+            <a:r>
+              <a:rPr lang="de-CH" dirty="0"/>
+              <a:t>median:  </a:t>
+            </a:r>
+            <a:r>
+              <a:rPr lang="de-CH" dirty="0"/>
+              <a:t>[3.72002177  16.17506233   0.07360088]</a:t>
+            </a:r>
+            <a:endParaRPr lang="de-CH" dirty="0"/>
+          </a:p>
+          <a:p>
+            <a:r>
+              <a:rPr lang="de-CH" dirty="0"/>
+              <a:t>Parameters mean:  </a:t>
+            </a:r>
+            <a:r>
+              <a:rPr lang="de-CH" dirty="0"/>
+              <a:t>[4.06078811  17.89454396   0.06385492]</a:t>
+            </a:r>
+            <a:endParaRPr lang="de-CH" dirty="0"/>
+          </a:p>
+          <a:p>
+            <a:endParaRPr lang="de-CH" dirty="0"/>
           </a:p>
         </p:txBody>
       </p:sp>
     </p:spTree>
     <p:extLst>
       <p:ext uri="{BB962C8B-B14F-4D97-AF65-F5344CB8AC3E}">
-        <p14:creationId xmlns:p14="http://schemas.microsoft.com/office/powerpoint/2010/main" val="3687265546"/>
+        <p14:creationId xmlns:p14="http://schemas.microsoft.com/office/powerpoint/2010/main" val="851325813"/>
       </p:ext>
     </p:extLst>
   </p:cSld>
   <p:clrMapOvr>
     <a:masterClrMapping/>
   </p:clrMapOvr>
-  <p:timing>
-    <p:tnLst>
-      <p:par>
-        <p:cTn id="1" dur="indefinite" restart="never" nodeType="tmRoot"/>
-      </p:par>
-    </p:tnLst>
-  </p:timing>
 </p:sld>
 </file>
 
@@ -6472,7 +6428,7 @@
       </p:grpSpPr>
       <p:sp>
         <p:nvSpPr>
-          <p:cNvPr id="4" name="Title 3"/>
+          <p:cNvPr id="7" name="Title 6"/>
           <p:cNvSpPr>
             <a:spLocks noGrp="1"/>
           </p:cNvSpPr>
@@ -6480,27 +6436,65 @@
             <p:ph type="title"/>
           </p:nvPr>
         </p:nvSpPr>
-        <p:spPr>
-          <a:xfrm>
-            <a:off x="900113" y="3284984"/>
-            <a:ext cx="7343775" cy="1368499"/>
-          </a:xfrm>
-        </p:spPr>
+        <p:spPr/>
         <p:txBody>
           <a:bodyPr/>
           <a:lstStyle/>
           <a:p>
             <a:r>
               <a:rPr lang="en-US" dirty="0" smtClean="0"/>
-              <a:t>Thank you for you attention.</a:t>
-            </a:r>
-            <a:br>
+              <a:t>Conclusion</a:t>
+            </a:r>
+            <a:endParaRPr lang="de-CH" dirty="0"/>
+          </a:p>
+        </p:txBody>
+      </p:sp>
+      <p:sp>
+        <p:nvSpPr>
+          <p:cNvPr id="8" name="Content Placeholder 7"/>
+          <p:cNvSpPr>
+            <a:spLocks noGrp="1"/>
+          </p:cNvSpPr>
+          <p:nvPr>
+            <p:ph idx="1"/>
+          </p:nvPr>
+        </p:nvSpPr>
+        <p:spPr/>
+        <p:txBody>
+          <a:bodyPr/>
+          <a:lstStyle/>
+          <a:p>
+            <a:pPr marL="285750" indent="-285750">
+              <a:buFont typeface="Arial" panose="020B0604020202020204" pitchFamily="34" charset="0"/>
+              <a:buChar char="•"/>
+            </a:pPr>
+            <a:r>
               <a:rPr lang="en-US" dirty="0" smtClean="0"/>
-            </a:br>
+              <a:t>Interference Model is the only model able to predict the intrusion cost without additional assumptions. </a:t>
+            </a:r>
+          </a:p>
+          <a:p>
+            <a:pPr marL="631825" lvl="1" indent="-285750">
+              <a:buFont typeface="Arial" panose="020B0604020202020204" pitchFamily="34" charset="0"/>
+              <a:buChar char="•"/>
+            </a:pPr>
             <a:r>
               <a:rPr lang="en-US" dirty="0" smtClean="0"/>
-              <a:t>Please don’t ask mean questions. </a:t>
-            </a:r>
+              <a:t>Maybe we don’t need a hard limit to explain working memory capacity.</a:t>
+            </a:r>
+          </a:p>
+          <a:p>
+            <a:pPr marL="631825" lvl="1" indent="-285750">
+              <a:buFont typeface="Arial" panose="020B0604020202020204" pitchFamily="34" charset="0"/>
+              <a:buChar char="•"/>
+            </a:pPr>
+            <a:endParaRPr lang="en-US" dirty="0"/>
+          </a:p>
+          <a:p>
+            <a:pPr marL="285750" indent="-285750">
+              <a:buFont typeface="Arial" panose="020B0604020202020204" pitchFamily="34" charset="0"/>
+              <a:buChar char="•"/>
+            </a:pPr>
             <a:endParaRPr lang="de-CH" dirty="0"/>
           </a:p>
         </p:txBody>
@@ -6508,7 +6502,7 @@
     </p:spTree>
     <p:extLst>
       <p:ext uri="{BB962C8B-B14F-4D97-AF65-F5344CB8AC3E}">
-        <p14:creationId xmlns:p14="http://schemas.microsoft.com/office/powerpoint/2010/main" val="2413552417"/>
+        <p14:creationId xmlns:p14="http://schemas.microsoft.com/office/powerpoint/2010/main" val="76387203"/>
       </p:ext>
     </p:extLst>
   </p:cSld>
@@ -6544,7 +6538,7 @@
       </p:grpSpPr>
       <p:sp>
         <p:nvSpPr>
-          <p:cNvPr id="3" name="Title 2"/>
+          <p:cNvPr id="2" name="Title 1"/>
           <p:cNvSpPr>
             <a:spLocks noGrp="1"/>
           </p:cNvSpPr>
@@ -6557,13 +6551,17 @@
           <a:bodyPr/>
           <a:lstStyle/>
           <a:p>
-            <a:endParaRPr lang="de-CH"/>
+            <a:r>
+              <a:rPr lang="en-US" dirty="0" smtClean="0"/>
+              <a:t>Caveat</a:t>
+            </a:r>
+            <a:endParaRPr lang="de-CH" dirty="0"/>
           </a:p>
         </p:txBody>
       </p:sp>
       <p:sp>
         <p:nvSpPr>
-          <p:cNvPr id="4" name="Content Placeholder 3"/>
+          <p:cNvPr id="3" name="Content Placeholder 2"/>
           <p:cNvSpPr>
             <a:spLocks noGrp="1"/>
           </p:cNvSpPr>
@@ -6576,47 +6574,65 @@
           <a:bodyPr/>
           <a:lstStyle/>
           <a:p>
-            <a:r>
-              <a:rPr lang="de-CH" dirty="0"/>
-              <a:t>Model Name: Interference Model, AIC: 39374.48509416144</a:t>
-            </a:r>
-          </a:p>
-          <a:p>
-            <a:r>
-              <a:rPr lang="de-CH" dirty="0"/>
-              <a:t>Parameters: ['b', 'a', 's', 'kappa', 'kappa_f', r']</a:t>
-            </a:r>
-          </a:p>
-          <a:p>
-            <a:r>
-              <a:rPr lang="de-CH" dirty="0"/>
-              <a:t>Parameters median:  [  0.0138   0.139   2.79   17.48  43.39   0.0705]</a:t>
-            </a:r>
-          </a:p>
-          <a:p>
-            <a:r>
-              <a:rPr lang="de-CH" dirty="0"/>
-              <a:t>Parameters mean:  [  0.0330   0.207   5.37   20.07   48.47   0.0706]</a:t>
-            </a:r>
-          </a:p>
-          <a:p>
-            <a:endParaRPr lang="de-CH" dirty="0"/>
-          </a:p>
-          <a:p>
-            <a:endParaRPr lang="de-CH" dirty="0"/>
+            <a:pPr marL="285750" indent="-285750">
+              <a:buFont typeface="Arial" panose="020B0604020202020204" pitchFamily="34" charset="0"/>
+              <a:buChar char="•"/>
+            </a:pPr>
+            <a:r>
+              <a:rPr lang="en-US" dirty="0" smtClean="0"/>
+              <a:t>The set-size effect of the intrusion cost</a:t>
+            </a:r>
+          </a:p>
+          <a:p>
+            <a:pPr marL="631825" lvl="1" indent="-285750">
+              <a:buFont typeface="Arial" panose="020B0604020202020204" pitchFamily="34" charset="0"/>
+              <a:buChar char="•"/>
+            </a:pPr>
+            <a:r>
+              <a:rPr lang="en-US" dirty="0" smtClean="0"/>
+              <a:t>IM can not predict any the effect of set size on intrusion cost</a:t>
+            </a:r>
+          </a:p>
+          <a:p>
+            <a:pPr marL="631825" lvl="1" indent="-285750">
+              <a:buFont typeface="Arial" panose="020B0604020202020204" pitchFamily="34" charset="0"/>
+              <a:buChar char="•"/>
+            </a:pPr>
+            <a:r>
+              <a:rPr lang="en-US" dirty="0" smtClean="0"/>
+              <a:t>However, there might be a set size effect.</a:t>
+            </a:r>
+          </a:p>
+          <a:p>
+            <a:pPr marL="631825" lvl="1" indent="-285750">
+              <a:buFont typeface="Arial" panose="020B0604020202020204" pitchFamily="34" charset="0"/>
+              <a:buChar char="•"/>
+            </a:pPr>
+            <a:r>
+              <a:rPr lang="en-US" dirty="0" smtClean="0"/>
+              <a:t>Bayes factor is 0.39 in favor of no set-size effect in the presented experiment.</a:t>
+            </a:r>
+            <a:endParaRPr lang="en-US" dirty="0"/>
           </a:p>
         </p:txBody>
       </p:sp>
     </p:spTree>
     <p:extLst>
       <p:ext uri="{BB962C8B-B14F-4D97-AF65-F5344CB8AC3E}">
-        <p14:creationId xmlns:p14="http://schemas.microsoft.com/office/powerpoint/2010/main" val="2149467222"/>
+        <p14:creationId xmlns:p14="http://schemas.microsoft.com/office/powerpoint/2010/main" val="3687265546"/>
       </p:ext>
     </p:extLst>
   </p:cSld>
   <p:clrMapOvr>
     <a:masterClrMapping/>
   </p:clrMapOvr>
+  <p:timing>
+    <p:tnLst>
+      <p:par>
+        <p:cTn id="1" dur="indefinite" restart="never" nodeType="tmRoot"/>
+      </p:par>
+    </p:tnLst>
+  </p:timing>
 </p:sld>
 </file>
 
@@ -6639,7 +6655,7 @@
       </p:grpSpPr>
       <p:sp>
         <p:nvSpPr>
-          <p:cNvPr id="2" name="Title 1"/>
+          <p:cNvPr id="4" name="Title 3"/>
           <p:cNvSpPr>
             <a:spLocks noGrp="1"/>
           </p:cNvSpPr>
@@ -6647,86 +6663,27 @@
             <p:ph type="title"/>
           </p:nvPr>
         </p:nvSpPr>
-        <p:spPr/>
+        <p:spPr>
+          <a:xfrm>
+            <a:off x="900113" y="3284984"/>
+            <a:ext cx="7343775" cy="1368499"/>
+          </a:xfrm>
+        </p:spPr>
         <p:txBody>
           <a:bodyPr/>
           <a:lstStyle/>
           <a:p>
-            <a:endParaRPr lang="de-CH"/>
-          </a:p>
-        </p:txBody>
-      </p:sp>
-      <p:sp>
-        <p:nvSpPr>
-          <p:cNvPr id="3" name="Content Placeholder 2"/>
-          <p:cNvSpPr>
-            <a:spLocks noGrp="1"/>
-          </p:cNvSpPr>
-          <p:nvPr>
-            <p:ph idx="1"/>
-          </p:nvPr>
-        </p:nvSpPr>
-        <p:spPr/>
-        <p:txBody>
-          <a:bodyPr/>
-          <a:lstStyle/>
-          <a:p>
-            <a:r>
-              <a:rPr lang="de-CH" dirty="0"/>
-              <a:t>Model Name: Slot Averaging Model, AIC: 44974.97870198049</a:t>
-            </a:r>
-          </a:p>
-          <a:p>
-            <a:r>
-              <a:rPr lang="de-CH" dirty="0"/>
-              <a:t>Parameters: ['k', 'kappa']</a:t>
-            </a:r>
-          </a:p>
-          <a:p>
-            <a:r>
-              <a:rPr lang="de-CH" dirty="0"/>
-              <a:t>Parameters median:  [  1.79  30.34]</a:t>
-            </a:r>
-          </a:p>
-          <a:p>
-            <a:r>
-              <a:rPr lang="de-CH" dirty="0"/>
-              <a:t>Parameters mean:  [  1.88  32.40]</a:t>
-            </a:r>
-          </a:p>
-          <a:p>
-            <a:endParaRPr lang="de-CH" dirty="0"/>
-          </a:p>
-          <a:p>
-            <a:r>
-              <a:rPr lang="de-CH" dirty="0"/>
-              <a:t>Model Name: Slot Averaging Model with Binding (growing), AIC: 42097.943510908495</a:t>
-            </a:r>
-          </a:p>
-          <a:p>
-            <a:r>
-              <a:rPr lang="de-CH" dirty="0"/>
-              <a:t>Parameters: ['k', 'kappa', 's'] </a:t>
-            </a:r>
-            <a:endParaRPr lang="de-CH" dirty="0" smtClean="0"/>
-          </a:p>
-          <a:p>
-            <a:r>
-              <a:rPr lang="de-CH" dirty="0" smtClean="0"/>
-              <a:t>Parameters </a:t>
-            </a:r>
-            <a:r>
-              <a:rPr lang="de-CH" dirty="0"/>
-              <a:t>median:  [  6.12  11.44   0.117]</a:t>
-            </a:r>
-          </a:p>
-          <a:p>
-            <a:r>
-              <a:rPr lang="de-CH" dirty="0"/>
-              <a:t>Parameters mean:  [  6.45  11.79    0.129]</a:t>
-            </a:r>
-          </a:p>
-          <a:p>
+            <a:r>
+              <a:rPr lang="en-US" dirty="0" smtClean="0"/>
+              <a:t>Thank you for you attention.</a:t>
+            </a:r>
+            <a:br>
+              <a:rPr lang="en-US" dirty="0" smtClean="0"/>
+            </a:br>
+            <a:r>
+              <a:rPr lang="en-US" dirty="0" smtClean="0"/>
+              <a:t>Please don’t ask mean questions. </a:t>
+            </a:r>
             <a:endParaRPr lang="de-CH" dirty="0"/>
           </a:p>
         </p:txBody>
@@ -6734,138 +6691,20 @@
     </p:spTree>
     <p:extLst>
       <p:ext uri="{BB962C8B-B14F-4D97-AF65-F5344CB8AC3E}">
-        <p14:creationId xmlns:p14="http://schemas.microsoft.com/office/powerpoint/2010/main" val="2207946174"/>
+        <p14:creationId xmlns:p14="http://schemas.microsoft.com/office/powerpoint/2010/main" val="2413552417"/>
       </p:ext>
     </p:extLst>
   </p:cSld>
   <p:clrMapOvr>
     <a:masterClrMapping/>
   </p:clrMapOvr>
-</p:sld>
-</file>
-
-<file path=ppt/slides/slide26.xml><?xml version="1.0" encoding="utf-8"?>
-<p:sld xmlns:a="http://schemas.openxmlformats.org/drawingml/2006/main" xmlns:r="http://schemas.openxmlformats.org/officeDocument/2006/relationships" xmlns:p="http://schemas.openxmlformats.org/presentationml/2006/main">
-  <p:cSld>
-    <p:spTree>
-      <p:nvGrpSpPr>
-        <p:cNvPr id="1" name=""/>
-        <p:cNvGrpSpPr/>
-        <p:nvPr/>
-      </p:nvGrpSpPr>
-      <p:grpSpPr>
-        <a:xfrm>
-          <a:off x="0" y="0"/>
-          <a:ext cx="0" cy="0"/>
-          <a:chOff x="0" y="0"/>
-          <a:chExt cx="0" cy="0"/>
-        </a:xfrm>
-      </p:grpSpPr>
-      <p:sp>
-        <p:nvSpPr>
-          <p:cNvPr id="2" name="Title 1"/>
-          <p:cNvSpPr>
-            <a:spLocks noGrp="1"/>
-          </p:cNvSpPr>
-          <p:nvPr>
-            <p:ph type="title"/>
-          </p:nvPr>
-        </p:nvSpPr>
-        <p:spPr/>
-        <p:txBody>
-          <a:bodyPr/>
-          <a:lstStyle/>
-          <a:p>
-            <a:endParaRPr lang="de-CH"/>
-          </a:p>
-        </p:txBody>
-      </p:sp>
-      <p:sp>
-        <p:nvSpPr>
-          <p:cNvPr id="3" name="Content Placeholder 2"/>
-          <p:cNvSpPr>
-            <a:spLocks noGrp="1"/>
-          </p:cNvSpPr>
-          <p:nvPr>
-            <p:ph idx="1"/>
-          </p:nvPr>
-        </p:nvSpPr>
-        <p:spPr/>
-        <p:txBody>
-          <a:bodyPr/>
-          <a:lstStyle/>
-          <a:p>
-            <a:r>
-              <a:rPr lang="de-CH" dirty="0"/>
-              <a:t>Model Name: Variable Precision Model, AIC: 40964.289815251075</a:t>
-            </a:r>
-          </a:p>
-          <a:p>
-            <a:r>
-              <a:rPr lang="de-CH" dirty="0"/>
-              <a:t>Parameters: ['J1', 'tau', 'aplha']</a:t>
-            </a:r>
-          </a:p>
-          <a:p>
-            <a:r>
-              <a:rPr lang="de-CH" dirty="0"/>
-              <a:t>Parameters median:  [ 86.53  84.16   0.967]</a:t>
-            </a:r>
-          </a:p>
-          <a:p>
-            <a:r>
-              <a:rPr lang="de-CH" dirty="0"/>
-              <a:t>Parameters mean:  [ 76.66  71.75   0.942]</a:t>
-            </a:r>
-          </a:p>
-          <a:p>
-            <a:endParaRPr lang="de-CH" dirty="0"/>
-          </a:p>
-          <a:p>
-            <a:r>
-              <a:rPr lang="de-CH" dirty="0"/>
-              <a:t>Model Name: Variable Precision Model with Binding, AIC: 39958.2773497592</a:t>
-            </a:r>
-          </a:p>
-          <a:p>
-            <a:r>
-              <a:rPr lang="de-CH" dirty="0"/>
-              <a:t>Parameters: ['J1', 'tau', 'aplha', </a:t>
-            </a:r>
-            <a:r>
-              <a:rPr lang="de-CH"/>
-              <a:t>'s</a:t>
-            </a:r>
-            <a:r>
-              <a:rPr lang="de-CH" smtClean="0"/>
-              <a:t>']</a:t>
-            </a:r>
-            <a:endParaRPr lang="de-CH" dirty="0"/>
-          </a:p>
-          <a:p>
-            <a:r>
-              <a:rPr lang="de-CH" dirty="0"/>
-              <a:t>Parameters median:  [ 78.02  47.13  0.627  0.0868]</a:t>
-            </a:r>
-          </a:p>
-          <a:p>
-            <a:r>
-              <a:rPr lang="de-CH" dirty="0"/>
-              <a:t>Parameters mean:  [ 71.73  54.35  0.585  0.0907]</a:t>
-            </a:r>
-          </a:p>
-        </p:txBody>
-      </p:sp>
-    </p:spTree>
-    <p:extLst>
-      <p:ext uri="{BB962C8B-B14F-4D97-AF65-F5344CB8AC3E}">
-        <p14:creationId xmlns:p14="http://schemas.microsoft.com/office/powerpoint/2010/main" val="1728990328"/>
-      </p:ext>
-    </p:extLst>
-  </p:cSld>
-  <p:clrMapOvr>
-    <a:masterClrMapping/>
-  </p:clrMapOvr>
+  <p:timing>
+    <p:tnLst>
+      <p:par>
+        <p:cTn id="1" dur="indefinite" restart="never" nodeType="tmRoot"/>
+      </p:par>
+    </p:tnLst>
+  </p:timing>
 </p:sld>
 </file>
 

</xml_diff>